<commit_message>
Se generan cambios en pantache index. para numero mas grandes
</commit_message>
<xml_diff>
--- a/img/Presentación1.pptx
+++ b/img/Presentación1.pptx
@@ -8,6 +8,9 @@
     <p:sldId id="256" r:id="rId2"/>
     <p:sldId id="257" r:id="rId3"/>
     <p:sldId id="258" r:id="rId4"/>
+    <p:sldId id="259" r:id="rId5"/>
+    <p:sldId id="261" r:id="rId6"/>
+    <p:sldId id="260" r:id="rId7"/>
   </p:sldIdLst>
   <p:sldSz cx="12192000" cy="6858000"/>
   <p:notesSz cx="6858000" cy="9144000"/>
@@ -106,6 +109,11 @@
       </a:defRPr>
     </a:lvl9pPr>
   </p:defaultTextStyle>
+  <p:extLst>
+    <p:ext uri="{EFAFB233-063F-42B5-8137-9DF3F51BA10A}">
+      <p15:sldGuideLst xmlns:p15="http://schemas.microsoft.com/office/powerpoint/2012/main"/>
+    </p:ext>
+  </p:extLst>
 </p:presentation>
 </file>
 
@@ -258,7 +266,7 @@
           <a:p>
             <a:fld id="{2C811770-3FE6-4026-838B-5024A615128B}" type="datetimeFigureOut">
               <a:rPr lang="es-MX" smtClean="0"/>
-              <a:t>02/06/2024</a:t>
+              <a:t>03/06/2024</a:t>
             </a:fld>
             <a:endParaRPr lang="es-MX"/>
           </a:p>
@@ -458,7 +466,7 @@
           <a:p>
             <a:fld id="{2C811770-3FE6-4026-838B-5024A615128B}" type="datetimeFigureOut">
               <a:rPr lang="es-MX" smtClean="0"/>
-              <a:t>02/06/2024</a:t>
+              <a:t>03/06/2024</a:t>
             </a:fld>
             <a:endParaRPr lang="es-MX"/>
           </a:p>
@@ -668,7 +676,7 @@
           <a:p>
             <a:fld id="{2C811770-3FE6-4026-838B-5024A615128B}" type="datetimeFigureOut">
               <a:rPr lang="es-MX" smtClean="0"/>
-              <a:t>02/06/2024</a:t>
+              <a:t>03/06/2024</a:t>
             </a:fld>
             <a:endParaRPr lang="es-MX"/>
           </a:p>
@@ -868,7 +876,7 @@
           <a:p>
             <a:fld id="{2C811770-3FE6-4026-838B-5024A615128B}" type="datetimeFigureOut">
               <a:rPr lang="es-MX" smtClean="0"/>
-              <a:t>02/06/2024</a:t>
+              <a:t>03/06/2024</a:t>
             </a:fld>
             <a:endParaRPr lang="es-MX"/>
           </a:p>
@@ -1144,7 +1152,7 @@
           <a:p>
             <a:fld id="{2C811770-3FE6-4026-838B-5024A615128B}" type="datetimeFigureOut">
               <a:rPr lang="es-MX" smtClean="0"/>
-              <a:t>02/06/2024</a:t>
+              <a:t>03/06/2024</a:t>
             </a:fld>
             <a:endParaRPr lang="es-MX"/>
           </a:p>
@@ -1412,7 +1420,7 @@
           <a:p>
             <a:fld id="{2C811770-3FE6-4026-838B-5024A615128B}" type="datetimeFigureOut">
               <a:rPr lang="es-MX" smtClean="0"/>
-              <a:t>02/06/2024</a:t>
+              <a:t>03/06/2024</a:t>
             </a:fld>
             <a:endParaRPr lang="es-MX"/>
           </a:p>
@@ -1827,7 +1835,7 @@
           <a:p>
             <a:fld id="{2C811770-3FE6-4026-838B-5024A615128B}" type="datetimeFigureOut">
               <a:rPr lang="es-MX" smtClean="0"/>
-              <a:t>02/06/2024</a:t>
+              <a:t>03/06/2024</a:t>
             </a:fld>
             <a:endParaRPr lang="es-MX"/>
           </a:p>
@@ -1969,7 +1977,7 @@
           <a:p>
             <a:fld id="{2C811770-3FE6-4026-838B-5024A615128B}" type="datetimeFigureOut">
               <a:rPr lang="es-MX" smtClean="0"/>
-              <a:t>02/06/2024</a:t>
+              <a:t>03/06/2024</a:t>
             </a:fld>
             <a:endParaRPr lang="es-MX"/>
           </a:p>
@@ -2082,7 +2090,7 @@
           <a:p>
             <a:fld id="{2C811770-3FE6-4026-838B-5024A615128B}" type="datetimeFigureOut">
               <a:rPr lang="es-MX" smtClean="0"/>
-              <a:t>02/06/2024</a:t>
+              <a:t>03/06/2024</a:t>
             </a:fld>
             <a:endParaRPr lang="es-MX"/>
           </a:p>
@@ -2395,7 +2403,7 @@
           <a:p>
             <a:fld id="{2C811770-3FE6-4026-838B-5024A615128B}" type="datetimeFigureOut">
               <a:rPr lang="es-MX" smtClean="0"/>
-              <a:t>02/06/2024</a:t>
+              <a:t>03/06/2024</a:t>
             </a:fld>
             <a:endParaRPr lang="es-MX"/>
           </a:p>
@@ -2684,7 +2692,7 @@
           <a:p>
             <a:fld id="{2C811770-3FE6-4026-838B-5024A615128B}" type="datetimeFigureOut">
               <a:rPr lang="es-MX" smtClean="0"/>
-              <a:t>02/06/2024</a:t>
+              <a:t>03/06/2024</a:t>
             </a:fld>
             <a:endParaRPr lang="es-MX"/>
           </a:p>
@@ -2927,7 +2935,7 @@
           <a:p>
             <a:fld id="{2C811770-3FE6-4026-838B-5024A615128B}" type="datetimeFigureOut">
               <a:rPr lang="es-MX" smtClean="0"/>
-              <a:t>02/06/2024</a:t>
+              <a:t>03/06/2024</a:t>
             </a:fld>
             <a:endParaRPr lang="es-MX"/>
           </a:p>
@@ -3614,6 +3622,596 @@
 </p:sld>
 </file>
 
+<file path=ppt/slides/slide4.xml><?xml version="1.0" encoding="utf-8"?>
+<p:sld xmlns:a="http://schemas.openxmlformats.org/drawingml/2006/main" xmlns:r="http://schemas.openxmlformats.org/officeDocument/2006/relationships" xmlns:p="http://schemas.openxmlformats.org/presentationml/2006/main">
+  <p:cSld>
+    <p:spTree>
+      <p:nvGrpSpPr>
+        <p:cNvPr id="1" name=""/>
+        <p:cNvGrpSpPr/>
+        <p:nvPr/>
+      </p:nvGrpSpPr>
+      <p:grpSpPr>
+        <a:xfrm>
+          <a:off x="0" y="0"/>
+          <a:ext cx="0" cy="0"/>
+          <a:chOff x="0" y="0"/>
+          <a:chExt cx="0" cy="0"/>
+        </a:xfrm>
+      </p:grpSpPr>
+      <p:grpSp>
+        <p:nvGrpSpPr>
+          <p:cNvPr id="17" name="Grupo 16">
+            <a:extLst>
+              <a:ext uri="{FF2B5EF4-FFF2-40B4-BE49-F238E27FC236}">
+                <a16:creationId xmlns:a16="http://schemas.microsoft.com/office/drawing/2014/main" id="{0EB366BD-EF1C-C0FD-2177-C784874C1B8B}"/>
+              </a:ext>
+            </a:extLst>
+          </p:cNvPr>
+          <p:cNvGrpSpPr/>
+          <p:nvPr/>
+        </p:nvGrpSpPr>
+        <p:grpSpPr>
+          <a:xfrm>
+            <a:off x="3920477" y="15240"/>
+            <a:ext cx="4160598" cy="6888784"/>
+            <a:chOff x="3920477" y="15240"/>
+            <a:chExt cx="4160598" cy="6888784"/>
+          </a:xfrm>
+        </p:grpSpPr>
+        <p:pic>
+          <p:nvPicPr>
+            <p:cNvPr id="11" name="Imagen 10">
+              <a:extLst>
+                <a:ext uri="{FF2B5EF4-FFF2-40B4-BE49-F238E27FC236}">
+                  <a16:creationId xmlns:a16="http://schemas.microsoft.com/office/drawing/2014/main" id="{C96830B0-7AF0-14B7-C7D8-D0BD18DF55E2}"/>
+                </a:ext>
+              </a:extLst>
+            </p:cNvPr>
+            <p:cNvPicPr>
+              <a:picLocks noChangeAspect="1"/>
+            </p:cNvPicPr>
+            <p:nvPr/>
+          </p:nvPicPr>
+          <p:blipFill>
+            <a:blip r:embed="rId2">
+              <a:extLst>
+                <a:ext uri="{BEBA8EAE-BF5A-486C-A8C5-ECC9F3942E4B}">
+                  <a14:imgProps xmlns:a14="http://schemas.microsoft.com/office/drawing/2010/main">
+                    <a14:imgLayer r:embed="rId3">
+                      <a14:imgEffect>
+                        <a14:backgroundRemoval t="9362" b="89362" l="3522" r="96631">
+                          <a14:foregroundMark x1="25115" y1="72340" x2="29862" y2="73617"/>
+                          <a14:foregroundMark x1="72588" y1="75319" x2="77029" y2="74468"/>
+                          <a14:foregroundMark x1="53905" y1="68936" x2="54058" y2="72340"/>
+                          <a14:foregroundMark x1="49464" y1="72766" x2="49464" y2="76596"/>
+                          <a14:foregroundMark x1="14701" y1="24255" x2="17152" y2="24255"/>
+                          <a14:foregroundMark x1="49617" y1="23404" x2="50842" y2="23830"/>
+                          <a14:foregroundMark x1="60031" y1="23830" x2="74119" y2="24681"/>
+                          <a14:foregroundMark x1="74119" y1="24681" x2="86217" y2="24255"/>
+                          <a14:foregroundMark x1="89587" y1="25106" x2="96631" y2="25106"/>
+                          <a14:foregroundMark x1="89740" y1="22128" x2="96018" y2="22979"/>
+                          <a14:foregroundMark x1="89893" y1="70638" x2="90046" y2="69787"/>
+                          <a14:foregroundMark x1="91730" y1="68511" x2="92037" y2="81277"/>
+                          <a14:foregroundMark x1="94028" y1="71489" x2="94181" y2="80000"/>
+                          <a14:foregroundMark x1="94028" y1="67234" x2="94487" y2="83404"/>
+                          <a14:foregroundMark x1="91424" y1="71064" x2="92190" y2="83404"/>
+                          <a14:foregroundMark x1="90658" y1="73191" x2="90965" y2="85532"/>
+                          <a14:foregroundMark x1="90658" y1="71489" x2="90658" y2="81277"/>
+                          <a14:foregroundMark x1="90505" y1="68511" x2="90658" y2="85106"/>
+                          <a14:foregroundMark x1="89893" y1="70638" x2="89587" y2="81702"/>
+                          <a14:foregroundMark x1="89587" y1="71489" x2="94793" y2="72340"/>
+                          <a14:foregroundMark x1="88974" y1="68085" x2="95253" y2="68936"/>
+                          <a14:foregroundMark x1="92343" y1="68936" x2="92649" y2="79149"/>
+                          <a14:foregroundMark x1="91424" y1="73191" x2="91884" y2="83830"/>
+                          <a14:foregroundMark x1="94640" y1="71915" x2="91884" y2="84681"/>
+                          <a14:foregroundMark x1="12098" y1="70638" x2="7044" y2="77021"/>
+                          <a14:foregroundMark x1="6738" y1="71915" x2="12711" y2="77872"/>
+                          <a14:foregroundMark x1="12711" y1="69362" x2="12711" y2="68936"/>
+                          <a14:foregroundMark x1="11639" y1="71915" x2="12098" y2="80426"/>
+                          <a14:foregroundMark x1="13017" y1="69362" x2="11639" y2="73191"/>
+                          <a14:foregroundMark x1="11026" y1="68511" x2="11179" y2="75319"/>
+                          <a14:foregroundMark x1="3522" y1="23830" x2="11792" y2="25957"/>
+                          <a14:foregroundMark x1="3982" y1="22128" x2="10720" y2="22553"/>
+                          <a14:foregroundMark x1="10107" y1="22553" x2="3828" y2="22128"/>
+                        </a14:backgroundRemoval>
+                      </a14:imgEffect>
+                    </a14:imgLayer>
+                  </a14:imgProps>
+                </a:ext>
+              </a:extLst>
+            </a:blip>
+            <a:stretch>
+              <a:fillRect/>
+            </a:stretch>
+          </p:blipFill>
+          <p:spPr>
+            <a:xfrm>
+              <a:off x="4065257" y="4733911"/>
+              <a:ext cx="3840532" cy="1382121"/>
+            </a:xfrm>
+            <a:prstGeom prst="rect">
+              <a:avLst/>
+            </a:prstGeom>
+          </p:spPr>
+        </p:pic>
+        <p:grpSp>
+          <p:nvGrpSpPr>
+            <p:cNvPr id="2" name="Grupo 1">
+              <a:extLst>
+                <a:ext uri="{FF2B5EF4-FFF2-40B4-BE49-F238E27FC236}">
+                  <a16:creationId xmlns:a16="http://schemas.microsoft.com/office/drawing/2014/main" id="{08AF3BF5-A3BE-9A9F-573B-D6B1B91249E3}"/>
+                </a:ext>
+              </a:extLst>
+            </p:cNvPr>
+            <p:cNvGrpSpPr/>
+            <p:nvPr/>
+          </p:nvGrpSpPr>
+          <p:grpSpPr>
+            <a:xfrm>
+              <a:off x="3920477" y="15240"/>
+              <a:ext cx="4101808" cy="6888784"/>
+              <a:chOff x="3920477" y="66109"/>
+              <a:chExt cx="4101808" cy="6888784"/>
+            </a:xfrm>
+          </p:grpSpPr>
+          <p:pic>
+            <p:nvPicPr>
+              <p:cNvPr id="3" name="Imagen 2" descr="Imagen que contiene hombre, exterior, edificio, parado&#10;&#10;Descripción generada automáticamente">
+                <a:extLst>
+                  <a:ext uri="{FF2B5EF4-FFF2-40B4-BE49-F238E27FC236}">
+                    <a16:creationId xmlns:a16="http://schemas.microsoft.com/office/drawing/2014/main" id="{E17C8452-D91A-C248-5443-8018D6969F16}"/>
+                  </a:ext>
+                </a:extLst>
+              </p:cNvPr>
+              <p:cNvPicPr>
+                <a:picLocks noChangeAspect="1"/>
+              </p:cNvPicPr>
+              <p:nvPr/>
+            </p:nvPicPr>
+            <p:blipFill rotWithShape="1">
+              <a:blip r:embed="rId4">
+                <a:duotone>
+                  <a:prstClr val="black"/>
+                  <a:schemeClr val="accent6">
+                    <a:tint val="45000"/>
+                    <a:satMod val="400000"/>
+                  </a:schemeClr>
+                </a:duotone>
+                <a:extLst>
+                  <a:ext uri="{BEBA8EAE-BF5A-486C-A8C5-ECC9F3942E4B}">
+                    <a14:imgProps xmlns:a14="http://schemas.microsoft.com/office/drawing/2010/main">
+                      <a14:imgLayer r:embed="rId5">
+                        <a14:imgEffect>
+                          <a14:backgroundRemoval t="81500" b="97900" l="7000" r="94500">
+                            <a14:foregroundMark x1="7000" y1="86700" x2="9625" y2="92600"/>
+                            <a14:foregroundMark x1="25375" y1="90300" x2="25875" y2="90600"/>
+                            <a14:foregroundMark x1="29250" y1="88600" x2="29000" y2="89700"/>
+                            <a14:foregroundMark x1="32125" y1="88100" x2="32250" y2="89000"/>
+                            <a14:foregroundMark x1="35250" y1="90300" x2="35250" y2="90300"/>
+                            <a14:foregroundMark x1="38250" y1="90000" x2="38250" y2="90000"/>
+                            <a14:foregroundMark x1="41500" y1="89700" x2="41500" y2="91800"/>
+                            <a14:foregroundMark x1="43875" y1="90600" x2="43875" y2="91400"/>
+                            <a14:foregroundMark x1="47250" y1="88600" x2="47375" y2="89700"/>
+                            <a14:foregroundMark x1="50875" y1="90100" x2="50875" y2="90400"/>
+                            <a14:foregroundMark x1="54125" y1="90300" x2="54125" y2="90700"/>
+                            <a14:foregroundMark x1="56625" y1="89600" x2="57000" y2="89900"/>
+                            <a14:foregroundMark x1="60375" y1="88200" x2="60375" y2="88900"/>
+                            <a14:foregroundMark x1="62875" y1="90300" x2="62875" y2="90300"/>
+                            <a14:foregroundMark x1="66250" y1="89900" x2="66250" y2="89900"/>
+                            <a14:foregroundMark x1="69750" y1="90000" x2="69750" y2="90000"/>
+                            <a14:foregroundMark x1="72250" y1="90000" x2="72250" y2="90600"/>
+                            <a14:foregroundMark x1="75250" y1="90600" x2="75250" y2="91200"/>
+                            <a14:foregroundMark x1="78375" y1="89900" x2="78375" y2="90700"/>
+                            <a14:foregroundMark x1="82250" y1="90600" x2="82125" y2="91300"/>
+                            <a14:foregroundMark x1="85250" y1="90600" x2="85250" y2="90600"/>
+                            <a14:foregroundMark x1="87875" y1="90400" x2="87875" y2="90400"/>
+                            <a14:foregroundMark x1="90375" y1="89200" x2="90375" y2="90000"/>
+                            <a14:foregroundMark x1="94250" y1="89900" x2="94500" y2="90300"/>
+                          </a14:backgroundRemoval>
+                        </a14:imgEffect>
+                        <a14:imgEffect>
+                          <a14:sharpenSoften amount="98000"/>
+                        </a14:imgEffect>
+                        <a14:imgEffect>
+                          <a14:colorTemperature colorTemp="11500"/>
+                        </a14:imgEffect>
+                        <a14:imgEffect>
+                          <a14:saturation sat="0"/>
+                        </a14:imgEffect>
+                        <a14:imgEffect>
+                          <a14:brightnessContrast bright="-1000" contrast="-21000"/>
+                        </a14:imgEffect>
+                      </a14:imgLayer>
+                    </a14:imgProps>
+                  </a:ext>
+                  <a:ext uri="{28A0092B-C50C-407E-A947-70E740481C1C}">
+                    <a14:useLocalDpi xmlns:a14="http://schemas.microsoft.com/office/drawing/2010/main" val="0"/>
+                  </a:ext>
+                </a:extLst>
+              </a:blip>
+              <a:srcRect t="79444"/>
+              <a:stretch/>
+            </p:blipFill>
+            <p:spPr>
+              <a:xfrm>
+                <a:off x="3920477" y="5900956"/>
+                <a:ext cx="4101808" cy="1053937"/>
+              </a:xfrm>
+              <a:prstGeom prst="rect">
+                <a:avLst/>
+              </a:prstGeom>
+            </p:spPr>
+          </p:pic>
+          <p:pic>
+            <p:nvPicPr>
+              <p:cNvPr id="6" name="Imagen 5" descr="Código QR&#10;&#10;Descripción generada automáticamente">
+                <a:extLst>
+                  <a:ext uri="{FF2B5EF4-FFF2-40B4-BE49-F238E27FC236}">
+                    <a16:creationId xmlns:a16="http://schemas.microsoft.com/office/drawing/2014/main" id="{9DA81257-C8A1-33C8-DF06-60BD24940A47}"/>
+                  </a:ext>
+                </a:extLst>
+              </p:cNvPr>
+              <p:cNvPicPr>
+                <a:picLocks noChangeAspect="1"/>
+              </p:cNvPicPr>
+              <p:nvPr/>
+            </p:nvPicPr>
+            <p:blipFill>
+              <a:blip r:embed="rId6">
+                <a:extLst>
+                  <a:ext uri="{28A0092B-C50C-407E-A947-70E740481C1C}">
+                    <a14:useLocalDpi xmlns:a14="http://schemas.microsoft.com/office/drawing/2010/main" val="0"/>
+                  </a:ext>
+                </a:extLst>
+              </a:blip>
+              <a:stretch>
+                <a:fillRect/>
+              </a:stretch>
+            </p:blipFill>
+            <p:spPr>
+              <a:xfrm>
+                <a:off x="4555338" y="66109"/>
+                <a:ext cx="2939668" cy="4237042"/>
+              </a:xfrm>
+              <a:prstGeom prst="rect">
+                <a:avLst/>
+              </a:prstGeom>
+            </p:spPr>
+          </p:pic>
+        </p:grpSp>
+        <p:pic>
+          <p:nvPicPr>
+            <p:cNvPr id="13" name="Imagen 12" descr="Gráfico&#10;&#10;Descripción generada automáticamente">
+              <a:extLst>
+                <a:ext uri="{FF2B5EF4-FFF2-40B4-BE49-F238E27FC236}">
+                  <a16:creationId xmlns:a16="http://schemas.microsoft.com/office/drawing/2014/main" id="{1FF75E03-464C-51E0-59FE-A51E629C65BD}"/>
+                </a:ext>
+              </a:extLst>
+            </p:cNvPr>
+            <p:cNvPicPr>
+              <a:picLocks noChangeAspect="1"/>
+            </p:cNvPicPr>
+            <p:nvPr/>
+          </p:nvPicPr>
+          <p:blipFill>
+            <a:blip r:embed="rId7">
+              <a:extLst>
+                <a:ext uri="{28A0092B-C50C-407E-A947-70E740481C1C}">
+                  <a14:useLocalDpi xmlns:a14="http://schemas.microsoft.com/office/drawing/2010/main" val="0"/>
+                </a:ext>
+              </a:extLst>
+            </a:blip>
+            <a:stretch>
+              <a:fillRect/>
+            </a:stretch>
+          </p:blipFill>
+          <p:spPr>
+            <a:xfrm>
+              <a:off x="7681761" y="4472887"/>
+              <a:ext cx="399314" cy="404373"/>
+            </a:xfrm>
+            <a:prstGeom prst="rect">
+              <a:avLst/>
+            </a:prstGeom>
+          </p:spPr>
+        </p:pic>
+        <p:sp>
+          <p:nvSpPr>
+            <p:cNvPr id="14" name="CuadroTexto 13">
+              <a:extLst>
+                <a:ext uri="{FF2B5EF4-FFF2-40B4-BE49-F238E27FC236}">
+                  <a16:creationId xmlns:a16="http://schemas.microsoft.com/office/drawing/2014/main" id="{48D3AD5F-29DD-AA6D-7B3A-B94BCD1AC29D}"/>
+                </a:ext>
+              </a:extLst>
+            </p:cNvPr>
+            <p:cNvSpPr txBox="1"/>
+            <p:nvPr/>
+          </p:nvSpPr>
+          <p:spPr>
+            <a:xfrm>
+              <a:off x="4240543" y="4616236"/>
+              <a:ext cx="3489960" cy="369332"/>
+            </a:xfrm>
+            <a:prstGeom prst="rect">
+              <a:avLst/>
+            </a:prstGeom>
+            <a:noFill/>
+          </p:spPr>
+          <p:txBody>
+            <a:bodyPr wrap="square" rtlCol="0">
+              <a:spAutoFit/>
+            </a:bodyPr>
+            <a:lstStyle/>
+            <a:p>
+              <a:r>
+                <a:rPr lang="es-ES" dirty="0"/>
+                <a:t>Julión Álvarez y su Norteño Banda</a:t>
+              </a:r>
+              <a:endParaRPr lang="es-MX" dirty="0"/>
+            </a:p>
+          </p:txBody>
+        </p:sp>
+        <p:sp>
+          <p:nvSpPr>
+            <p:cNvPr id="16" name="CuadroTexto 15">
+              <a:extLst>
+                <a:ext uri="{FF2B5EF4-FFF2-40B4-BE49-F238E27FC236}">
+                  <a16:creationId xmlns:a16="http://schemas.microsoft.com/office/drawing/2014/main" id="{4E75D770-13C7-E8D9-2B5B-7129ECA0440B}"/>
+                </a:ext>
+              </a:extLst>
+            </p:cNvPr>
+            <p:cNvSpPr txBox="1"/>
+            <p:nvPr/>
+          </p:nvSpPr>
+          <p:spPr>
+            <a:xfrm>
+              <a:off x="5076057" y="4252282"/>
+              <a:ext cx="1818932" cy="369332"/>
+            </a:xfrm>
+            <a:prstGeom prst="rect">
+              <a:avLst/>
+            </a:prstGeom>
+            <a:noFill/>
+          </p:spPr>
+          <p:txBody>
+            <a:bodyPr wrap="square">
+              <a:spAutoFit/>
+            </a:bodyPr>
+            <a:lstStyle/>
+            <a:p>
+              <a:r>
+                <a:rPr lang="es-ES" dirty="0"/>
+                <a:t>Regalo de Dios </a:t>
+              </a:r>
+              <a:endParaRPr lang="es-MX" dirty="0"/>
+            </a:p>
+          </p:txBody>
+        </p:sp>
+      </p:grpSp>
+    </p:spTree>
+    <p:extLst>
+      <p:ext uri="{BB962C8B-B14F-4D97-AF65-F5344CB8AC3E}">
+        <p14:creationId xmlns:p14="http://schemas.microsoft.com/office/powerpoint/2010/main" val="393153546"/>
+      </p:ext>
+    </p:extLst>
+  </p:cSld>
+  <p:clrMapOvr>
+    <a:masterClrMapping/>
+  </p:clrMapOvr>
+</p:sld>
+</file>
+
+<file path=ppt/slides/slide5.xml><?xml version="1.0" encoding="utf-8"?>
+<p:sld xmlns:a="http://schemas.openxmlformats.org/drawingml/2006/main" xmlns:r="http://schemas.openxmlformats.org/officeDocument/2006/relationships" xmlns:p="http://schemas.openxmlformats.org/presentationml/2006/main">
+  <p:cSld>
+    <p:spTree>
+      <p:nvGrpSpPr>
+        <p:cNvPr id="1" name=""/>
+        <p:cNvGrpSpPr/>
+        <p:nvPr/>
+      </p:nvGrpSpPr>
+      <p:grpSpPr>
+        <a:xfrm>
+          <a:off x="0" y="0"/>
+          <a:ext cx="0" cy="0"/>
+          <a:chOff x="0" y="0"/>
+          <a:chExt cx="0" cy="0"/>
+        </a:xfrm>
+      </p:grpSpPr>
+      <p:pic>
+        <p:nvPicPr>
+          <p:cNvPr id="5" name="Imagen 4" descr="Código QR&#10;&#10;Descripción generada automáticamente">
+            <a:extLst>
+              <a:ext uri="{FF2B5EF4-FFF2-40B4-BE49-F238E27FC236}">
+                <a16:creationId xmlns:a16="http://schemas.microsoft.com/office/drawing/2014/main" id="{692788DE-88EA-4E48-A1B0-D27D05FCD328}"/>
+              </a:ext>
+            </a:extLst>
+          </p:cNvPr>
+          <p:cNvPicPr>
+            <a:picLocks noChangeAspect="1"/>
+          </p:cNvPicPr>
+          <p:nvPr/>
+        </p:nvPicPr>
+        <p:blipFill>
+          <a:blip r:embed="rId2">
+            <a:extLst>
+              <a:ext uri="{28A0092B-C50C-407E-A947-70E740481C1C}">
+                <a14:useLocalDpi xmlns:a14="http://schemas.microsoft.com/office/drawing/2010/main" val="0"/>
+              </a:ext>
+            </a:extLst>
+          </a:blip>
+          <a:stretch>
+            <a:fillRect/>
+          </a:stretch>
+        </p:blipFill>
+        <p:spPr>
+          <a:xfrm>
+            <a:off x="4349413" y="281940"/>
+            <a:ext cx="3133427" cy="4516313"/>
+          </a:xfrm>
+          <a:prstGeom prst="rect">
+            <a:avLst/>
+          </a:prstGeom>
+        </p:spPr>
+      </p:pic>
+    </p:spTree>
+    <p:extLst>
+      <p:ext uri="{BB962C8B-B14F-4D97-AF65-F5344CB8AC3E}">
+        <p14:creationId xmlns:p14="http://schemas.microsoft.com/office/powerpoint/2010/main" val="3605387726"/>
+      </p:ext>
+    </p:extLst>
+  </p:cSld>
+  <p:clrMapOvr>
+    <a:masterClrMapping/>
+  </p:clrMapOvr>
+</p:sld>
+</file>
+
+<file path=ppt/slides/slide6.xml><?xml version="1.0" encoding="utf-8"?>
+<p:sld xmlns:a="http://schemas.openxmlformats.org/drawingml/2006/main" xmlns:r="http://schemas.openxmlformats.org/officeDocument/2006/relationships" xmlns:p="http://schemas.openxmlformats.org/presentationml/2006/main">
+  <p:cSld>
+    <p:spTree>
+      <p:nvGrpSpPr>
+        <p:cNvPr id="1" name=""/>
+        <p:cNvGrpSpPr/>
+        <p:nvPr/>
+      </p:nvGrpSpPr>
+      <p:grpSpPr>
+        <a:xfrm>
+          <a:off x="0" y="0"/>
+          <a:ext cx="0" cy="0"/>
+          <a:chOff x="0" y="0"/>
+          <a:chExt cx="0" cy="0"/>
+        </a:xfrm>
+      </p:grpSpPr>
+      <p:grpSp>
+        <p:nvGrpSpPr>
+          <p:cNvPr id="5" name="Grupo 4">
+            <a:extLst>
+              <a:ext uri="{FF2B5EF4-FFF2-40B4-BE49-F238E27FC236}">
+                <a16:creationId xmlns:a16="http://schemas.microsoft.com/office/drawing/2014/main" id="{C7E2A7CE-3323-A47C-AB88-7300250D40B7}"/>
+              </a:ext>
+            </a:extLst>
+          </p:cNvPr>
+          <p:cNvGrpSpPr/>
+          <p:nvPr/>
+        </p:nvGrpSpPr>
+        <p:grpSpPr>
+          <a:xfrm>
+            <a:off x="3179806" y="-14416"/>
+            <a:ext cx="5486400" cy="6798275"/>
+            <a:chOff x="3179806" y="-14416"/>
+            <a:chExt cx="5486400" cy="6798275"/>
+          </a:xfrm>
+        </p:grpSpPr>
+        <p:pic>
+          <p:nvPicPr>
+            <p:cNvPr id="4" name="Imagen 3" descr="Imagen que contiene Texto&#10;&#10;Descripción generada automáticamente">
+              <a:extLst>
+                <a:ext uri="{FF2B5EF4-FFF2-40B4-BE49-F238E27FC236}">
+                  <a16:creationId xmlns:a16="http://schemas.microsoft.com/office/drawing/2014/main" id="{B728F5E6-67AA-C396-92C3-88BA07426F99}"/>
+                </a:ext>
+              </a:extLst>
+            </p:cNvPr>
+            <p:cNvPicPr>
+              <a:picLocks noChangeAspect="1"/>
+            </p:cNvPicPr>
+            <p:nvPr/>
+          </p:nvPicPr>
+          <p:blipFill rotWithShape="1">
+            <a:blip r:embed="rId2">
+              <a:extLst>
+                <a:ext uri="{BEBA8EAE-BF5A-486C-A8C5-ECC9F3942E4B}">
+                  <a14:imgProps xmlns:a14="http://schemas.microsoft.com/office/drawing/2010/main">
+                    <a14:imgLayer r:embed="rId3">
+                      <a14:imgEffect>
+                        <a14:artisticGlowEdges/>
+                      </a14:imgEffect>
+                    </a14:imgLayer>
+                  </a14:imgProps>
+                </a:ext>
+                <a:ext uri="{28A0092B-C50C-407E-A947-70E740481C1C}">
+                  <a14:useLocalDpi xmlns:a14="http://schemas.microsoft.com/office/drawing/2010/main" val="0"/>
+                </a:ext>
+              </a:extLst>
+            </a:blip>
+            <a:srcRect t="80361"/>
+            <a:stretch/>
+          </p:blipFill>
+          <p:spPr>
+            <a:xfrm>
+              <a:off x="3179806" y="5436973"/>
+              <a:ext cx="5486400" cy="1346886"/>
+            </a:xfrm>
+            <a:prstGeom prst="roundRect">
+              <a:avLst>
+                <a:gd name="adj" fmla="val 8594"/>
+              </a:avLst>
+            </a:prstGeom>
+            <a:solidFill>
+              <a:srgbClr val="FFFFFF">
+                <a:shade val="85000"/>
+              </a:srgbClr>
+            </a:solidFill>
+            <a:ln>
+              <a:noFill/>
+            </a:ln>
+            <a:effectLst>
+              <a:reflection blurRad="12700" stA="38000" endPos="28000" dist="5000" dir="5400000" sy="-100000" algn="bl" rotWithShape="0"/>
+            </a:effectLst>
+          </p:spPr>
+        </p:pic>
+        <p:pic>
+          <p:nvPicPr>
+            <p:cNvPr id="6" name="Imagen 5" descr="Código QR&#10;&#10;Descripción generada automáticamente">
+              <a:extLst>
+                <a:ext uri="{FF2B5EF4-FFF2-40B4-BE49-F238E27FC236}">
+                  <a16:creationId xmlns:a16="http://schemas.microsoft.com/office/drawing/2014/main" id="{9DA81257-C8A1-33C8-DF06-60BD24940A47}"/>
+                </a:ext>
+              </a:extLst>
+            </p:cNvPr>
+            <p:cNvPicPr>
+              <a:picLocks noChangeAspect="1"/>
+            </p:cNvPicPr>
+            <p:nvPr/>
+          </p:nvPicPr>
+          <p:blipFill>
+            <a:blip r:embed="rId4">
+              <a:extLst>
+                <a:ext uri="{28A0092B-C50C-407E-A947-70E740481C1C}">
+                  <a14:useLocalDpi xmlns:a14="http://schemas.microsoft.com/office/drawing/2010/main" val="0"/>
+                </a:ext>
+              </a:extLst>
+            </a:blip>
+            <a:stretch>
+              <a:fillRect/>
+            </a:stretch>
+          </p:blipFill>
+          <p:spPr>
+            <a:xfrm>
+              <a:off x="4089400" y="-14416"/>
+              <a:ext cx="3733113" cy="5380659"/>
+            </a:xfrm>
+            <a:prstGeom prst="rect">
+              <a:avLst/>
+            </a:prstGeom>
+          </p:spPr>
+        </p:pic>
+      </p:grpSp>
+    </p:spTree>
+    <p:extLst>
+      <p:ext uri="{BB962C8B-B14F-4D97-AF65-F5344CB8AC3E}">
+        <p14:creationId xmlns:p14="http://schemas.microsoft.com/office/powerpoint/2010/main" val="2406224565"/>
+      </p:ext>
+    </p:extLst>
+  </p:cSld>
+  <p:clrMapOvr>
+    <a:masterClrMapping/>
+  </p:clrMapOvr>
+</p:sld>
+</file>
+
 <file path=ppt/theme/theme1.xml><?xml version="1.0" encoding="utf-8"?>
 <a:theme xmlns:a="http://schemas.openxmlformats.org/drawingml/2006/main" name="Tema de Office">
   <a:themeElements>

</xml_diff>